<commit_message>
update genome analysis platforms lecture
</commit_message>
<xml_diff>
--- a/LectureFiles/cshl/2014/GenomeAnalysisPlatforms.pptx
+++ b/LectureFiles/cshl/2014/GenomeAnalysisPlatforms.pptx
@@ -263,7 +263,7 @@
               <a:pPr>
                 <a:defRPr/>
               </a:pPr>
-              <a:t>11/18/14</a:t>
+              <a:t>11/19/14</a:t>
             </a:fld>
             <a:endParaRPr lang="en-US"/>
           </a:p>
@@ -470,7 +470,7 @@
               <a:pPr>
                 <a:defRPr/>
               </a:pPr>
-              <a:t>11/18/14</a:t>
+              <a:t>11/19/14</a:t>
             </a:fld>
             <a:endParaRPr lang="en-US"/>
           </a:p>
@@ -3923,7 +3923,7 @@
               <a:pPr>
                 <a:defRPr/>
               </a:pPr>
-              <a:t>11/18/14</a:t>
+              <a:t>11/19/14</a:t>
             </a:fld>
             <a:endParaRPr lang="en-US"/>
           </a:p>
@@ -4879,7 +4879,6 @@
               <a:rPr lang="en-US" dirty="0"/>
               <a:t>in contrast to conventional HPC architecture which usually relies on a parallel file system (compute and data separated, but connected with high-speed networking).</a:t>
             </a:r>
-            <a:endParaRPr lang="en-US" dirty="0"/>
           </a:p>
         </p:txBody>
       </p:sp>
@@ -4973,7 +4972,6 @@
               <a:rPr lang="en-US" dirty="0" smtClean="0"/>
               <a:t>Depends where you are on the informatics spectrum.  Do you want to:</a:t>
             </a:r>
-            <a:endParaRPr lang="en-US" dirty="0" smtClean="0"/>
           </a:p>
           <a:p>
             <a:pPr lvl="1"/>
@@ -4986,11 +4984,7 @@
             <a:pPr lvl="2"/>
             <a:r>
               <a:rPr lang="en-US" dirty="0" smtClean="0"/>
-              <a:t>Maximum </a:t>
-            </a:r>
-            <a:r>
-              <a:rPr lang="en-US" dirty="0" smtClean="0"/>
-              <a:t>flexibility. </a:t>
+              <a:t>Maximum flexibility. </a:t>
             </a:r>
             <a:r>
               <a:rPr lang="en-US" dirty="0"/>
@@ -4998,11 +4992,7 @@
             </a:r>
             <a:r>
               <a:rPr lang="en-US" dirty="0" smtClean="0"/>
-              <a:t>erformance </a:t>
-            </a:r>
-            <a:r>
-              <a:rPr lang="en-US" dirty="0" smtClean="0"/>
-              <a:t>and scalability are determined by how well you engineer it.</a:t>
+              <a:t>erformance and scalability are determined by how well you engineer it.</a:t>
             </a:r>
           </a:p>
           <a:p>
@@ -5039,7 +5029,11 @@
             </a:r>
             <a:r>
               <a:rPr lang="en-US" dirty="0" err="1" smtClean="0"/>
-              <a:t>bcbio-nextgene</a:t>
+              <a:t>bcbio-</a:t>
+            </a:r>
+            <a:r>
+              <a:rPr lang="en-US" dirty="0" err="1" smtClean="0"/>
+              <a:t>nextgen</a:t>
             </a:r>
             <a:r>
               <a:rPr lang="en-US" dirty="0" smtClean="0"/>
@@ -5051,11 +5045,7 @@
             </a:r>
             <a:r>
               <a:rPr lang="en-US" dirty="0" smtClean="0"/>
-              <a:t>, etc</a:t>
-            </a:r>
-            <a:r>
-              <a:rPr lang="en-US" dirty="0" smtClean="0"/>
-              <a:t>.</a:t>
+              <a:t>, etc.</a:t>
             </a:r>
           </a:p>
           <a:p>
@@ -6723,14 +6713,12 @@
               <a:rPr lang="en-US" dirty="0" smtClean="0"/>
               <a:t>’</a:t>
             </a:r>
-            <a:endParaRPr lang="en-US" dirty="0" smtClean="0"/>
           </a:p>
           <a:p>
             <a:r>
               <a:rPr lang="en-US" dirty="0" smtClean="0"/>
               <a:t>Pipelines</a:t>
             </a:r>
-            <a:endParaRPr lang="en-US" dirty="0" smtClean="0"/>
           </a:p>
           <a:p>
             <a:r>
@@ -6755,11 +6743,7 @@
           <a:p>
             <a:r>
               <a:rPr lang="en-US" dirty="0" smtClean="0"/>
-              <a:t>Virtualization </a:t>
-            </a:r>
-            <a:r>
-              <a:rPr lang="en-US" dirty="0" smtClean="0"/>
-              <a:t>and virtual machines</a:t>
+              <a:t>Virtualization and virtual machines</a:t>
             </a:r>
           </a:p>
           <a:p>
@@ -6821,11 +6805,7 @@
           <a:p>
             <a:r>
               <a:rPr lang="en-US" dirty="0" smtClean="0"/>
-              <a:t>Job </a:t>
-            </a:r>
-            <a:r>
-              <a:rPr lang="en-US" dirty="0" smtClean="0"/>
-              <a:t>schedulers.  </a:t>
+              <a:t>Job schedulers.  </a:t>
             </a:r>
             <a:r>
               <a:rPr lang="en-US" dirty="0"/>
@@ -7313,11 +7293,7 @@
           <a:p>
             <a:r>
               <a:rPr lang="en-US" dirty="0" smtClean="0"/>
-              <a:t>For example, instead of using a local server or buying 25 computers with 8 CPU’s each, 70Gg of RAM, etc. for the RNA-seq course we rented these computers on the Amazon ‘Cloud’.  </a:t>
-            </a:r>
-            <a:r>
-              <a:rPr lang="en-US" dirty="0" smtClean="0"/>
-              <a:t>All analysis for the course actually happened at a massive data center in Northern Virginia</a:t>
+              <a:t>For example, instead of using a local server or buying 25 computers with 8 CPU’s each, 70Gg of RAM, etc. for the RNA-seq course we rented these computers on the Amazon ‘Cloud’.  All analysis for the course actually happened at a massive data center in Northern Virginia</a:t>
             </a:r>
             <a:endParaRPr lang="en-US" dirty="0"/>
           </a:p>
@@ -7787,19 +7763,7 @@
           <a:p>
             <a:r>
               <a:rPr lang="en-US" dirty="0" smtClean="0"/>
-              <a:t>E.g</a:t>
-            </a:r>
-            <a:r>
-              <a:rPr lang="en-US" dirty="0" smtClean="0"/>
-              <a:t>. DNA Nexus Platforms provides software development kit with support for several programming </a:t>
-            </a:r>
-            <a:r>
-              <a:rPr lang="en-US" dirty="0" smtClean="0"/>
-              <a:t>languages to help you build pipelines </a:t>
-            </a:r>
-            <a:r>
-              <a:rPr lang="en-US" dirty="0" smtClean="0"/>
-              <a:t>efficiently in their system</a:t>
+              <a:t>E.g. DNA Nexus Platforms provides software development kit with support for several programming languages to help you build pipelines efficiently in their system</a:t>
             </a:r>
             <a:endParaRPr lang="en-US" dirty="0"/>
           </a:p>

</xml_diff>